<commit_message>
slides + comentários adicionados
</commit_message>
<xml_diff>
--- a/slidesfinais.pptx
+++ b/slidesfinais.pptx
@@ -209,7 +209,7 @@
           <a:p>
             <a:fld id="{AB38FD77-722C-49E2-AEB2-4580223DE7D4}" type="datetimeFigureOut">
               <a:rPr lang="pt-PT" smtClean="0"/>
-              <a:t>29/05/2025</a:t>
+              <a:t>05/06/2025</a:t>
             </a:fld>
             <a:endParaRPr lang="pt-PT"/>
           </a:p>
@@ -5275,24 +5275,8 @@
           <a:p>
             <a:r>
               <a:rPr lang="pt-PT" u="sng" dirty="0"/>
-              <a:t>Blender </a:t>
-            </a:r>
-            <a:r>
-              <a:rPr lang="pt-PT" dirty="0"/>
-              <a:t>vídeo</a:t>
-            </a:r>
-            <a:r>
-              <a:rPr lang="pt-PT" u="sng" dirty="0"/>
-              <a:t> </a:t>
-            </a:r>
-            <a:r>
-              <a:rPr lang="pt-PT" u="sng" dirty="0" err="1"/>
-              <a:t>tutorials</a:t>
-            </a:r>
-            <a:endParaRPr lang="pt-PT" u="sng" dirty="0"/>
-          </a:p>
-          <a:p>
-            <a:endParaRPr lang="pt-PT" u="sng" dirty="0"/>
+              <a:t>www.blenderguru.com</a:t>
+            </a:r>
           </a:p>
           <a:p>
             <a:endParaRPr lang="pt-PT" u="sng" dirty="0"/>
@@ -6536,68 +6520,68 @@
         </p:spPr>
         <p:txBody>
           <a:bodyPr>
-            <a:normAutofit fontScale="85000" lnSpcReduction="10000"/>
+            <a:normAutofit fontScale="77500" lnSpcReduction="20000"/>
           </a:bodyPr>
           <a:lstStyle/>
           <a:p>
             <a:r>
-              <a:rPr lang="pt-PT" dirty="0"/>
+              <a:rPr lang="pt-PT" sz="2600" dirty="0"/>
               <a:t>Game </a:t>
             </a:r>
             <a:r>
-              <a:rPr lang="pt-PT" dirty="0" err="1"/>
+              <a:rPr lang="pt-PT" sz="2600" dirty="0" err="1"/>
               <a:t>behavior</a:t>
             </a:r>
             <a:r>
-              <a:rPr lang="pt-PT" dirty="0"/>
-              <a:t> </a:t>
-            </a:r>
-            <a:r>
-              <a:rPr lang="pt-PT" dirty="0" err="1"/>
+              <a:rPr lang="pt-PT" sz="2600" dirty="0"/>
+              <a:t> </a:t>
+            </a:r>
+            <a:r>
+              <a:rPr lang="pt-PT" sz="2600" dirty="0" err="1"/>
               <a:t>requires</a:t>
             </a:r>
             <a:r>
-              <a:rPr lang="pt-PT" dirty="0"/>
-              <a:t> </a:t>
-            </a:r>
-            <a:r>
-              <a:rPr lang="pt-PT" dirty="0" err="1"/>
+              <a:rPr lang="pt-PT" sz="2600" dirty="0"/>
+              <a:t> </a:t>
+            </a:r>
+            <a:r>
+              <a:rPr lang="pt-PT" sz="2600" dirty="0" err="1"/>
               <a:t>dynamic</a:t>
             </a:r>
             <a:r>
-              <a:rPr lang="pt-PT" dirty="0"/>
-              <a:t> </a:t>
-            </a:r>
-            <a:r>
-              <a:rPr lang="pt-PT" dirty="0" err="1"/>
+              <a:rPr lang="pt-PT" sz="2600" dirty="0"/>
+              <a:t> </a:t>
+            </a:r>
+            <a:r>
+              <a:rPr lang="pt-PT" sz="2600" dirty="0" err="1"/>
               <a:t>animation</a:t>
             </a:r>
             <a:r>
-              <a:rPr lang="pt-PT" dirty="0"/>
-              <a:t> </a:t>
-            </a:r>
-            <a:r>
-              <a:rPr lang="pt-PT" dirty="0" err="1"/>
+              <a:rPr lang="pt-PT" sz="2600" dirty="0"/>
+              <a:t> </a:t>
+            </a:r>
+            <a:r>
+              <a:rPr lang="pt-PT" sz="2600" dirty="0" err="1"/>
               <a:t>of</a:t>
             </a:r>
             <a:r>
-              <a:rPr lang="pt-PT" dirty="0"/>
-              <a:t> </a:t>
-            </a:r>
-            <a:r>
-              <a:rPr lang="pt-PT" dirty="0" err="1"/>
+              <a:rPr lang="pt-PT" sz="2600" dirty="0"/>
+              <a:t> </a:t>
+            </a:r>
+            <a:r>
+              <a:rPr lang="pt-PT" sz="2600" dirty="0" err="1"/>
               <a:t>player</a:t>
             </a:r>
             <a:r>
-              <a:rPr lang="pt-PT" dirty="0"/>
-              <a:t> </a:t>
-            </a:r>
-            <a:r>
-              <a:rPr lang="pt-PT" dirty="0" err="1"/>
+              <a:rPr lang="pt-PT" sz="2600" dirty="0"/>
+              <a:t> </a:t>
+            </a:r>
+            <a:r>
+              <a:rPr lang="pt-PT" sz="2600" dirty="0" err="1"/>
               <a:t>and</a:t>
             </a:r>
             <a:r>
-              <a:rPr lang="pt-PT" dirty="0"/>
+              <a:rPr lang="pt-PT" sz="2600" dirty="0"/>
               <a:t> boss.</a:t>
             </a:r>
           </a:p>
@@ -6605,38 +6589,38 @@
             <a:pPr marL="0" indent="0">
               <a:buNone/>
             </a:pPr>
-            <a:endParaRPr lang="pt-PT" dirty="0"/>
-          </a:p>
-          <a:p>
-            <a:r>
-              <a:rPr lang="pt-PT" dirty="0" err="1"/>
+            <a:endParaRPr lang="pt-PT" sz="2600" dirty="0"/>
+          </a:p>
+          <a:p>
+            <a:r>
+              <a:rPr lang="pt-PT" sz="2600" dirty="0" err="1"/>
               <a:t>Animations</a:t>
             </a:r>
             <a:r>
-              <a:rPr lang="pt-PT" dirty="0"/>
-              <a:t> </a:t>
-            </a:r>
-            <a:r>
-              <a:rPr lang="pt-PT" dirty="0" err="1"/>
+              <a:rPr lang="pt-PT" sz="2600" dirty="0"/>
+              <a:t> </a:t>
+            </a:r>
+            <a:r>
+              <a:rPr lang="pt-PT" sz="2600" dirty="0" err="1"/>
               <a:t>created</a:t>
             </a:r>
             <a:r>
-              <a:rPr lang="pt-PT" dirty="0"/>
+              <a:rPr lang="pt-PT" sz="2600" dirty="0"/>
               <a:t> to </a:t>
             </a:r>
             <a:r>
-              <a:rPr lang="pt-PT" dirty="0" err="1"/>
+              <a:rPr lang="pt-PT" sz="2600" dirty="0" err="1"/>
               <a:t>support</a:t>
             </a:r>
             <a:r>
-              <a:rPr lang="pt-PT" dirty="0"/>
+              <a:rPr lang="pt-PT" sz="2600" dirty="0"/>
               <a:t> diferente </a:t>
             </a:r>
             <a:r>
-              <a:rPr lang="pt-PT" dirty="0" err="1"/>
+              <a:rPr lang="pt-PT" sz="2600" dirty="0" err="1"/>
               <a:t>scenarios</a:t>
             </a:r>
-            <a:endParaRPr lang="pt-PT" dirty="0"/>
+            <a:endParaRPr lang="pt-PT" sz="2600" dirty="0"/>
           </a:p>
           <a:p>
             <a:endParaRPr lang="pt-PT" dirty="0"/>
@@ -7985,7 +7969,7 @@
         </p:spPr>
         <p:txBody>
           <a:bodyPr>
-            <a:normAutofit fontScale="85000" lnSpcReduction="10000"/>
+            <a:noAutofit/>
           </a:bodyPr>
           <a:lstStyle/>
           <a:p>

</xml_diff>